<commit_message>
Tipografía cambiada el la pirmera diapositiva
</commit_message>
<xml_diff>
--- a/contenido_curso/Programación Web - Día 1.pptx
+++ b/contenido_curso/Programación Web - Día 1.pptx
@@ -222,7 +222,7 @@
           <a:p>
             <a:fld id="{831EFE70-F5D3-49F6-8C2B-91E6FE538D8A}" type="datetimeFigureOut">
               <a:rPr lang="es-VE" smtClean="0"/>
-              <a:t>18/4/2023</a:t>
+              <a:t>18/7/2023</a:t>
             </a:fld>
             <a:endParaRPr lang="es-VE"/>
           </a:p>
@@ -671,7 +671,7 @@
           <a:p>
             <a:fld id="{823E8A56-526A-4CC4-96EA-C5813A8209A1}" type="datetimeFigureOut">
               <a:rPr lang="es-VE" smtClean="0"/>
-              <a:t>18/4/2023</a:t>
+              <a:t>18/7/2023</a:t>
             </a:fld>
             <a:endParaRPr lang="es-VE"/>
           </a:p>
@@ -841,7 +841,7 @@
           <a:p>
             <a:fld id="{823E8A56-526A-4CC4-96EA-C5813A8209A1}" type="datetimeFigureOut">
               <a:rPr lang="es-VE" smtClean="0"/>
-              <a:t>18/4/2023</a:t>
+              <a:t>18/7/2023</a:t>
             </a:fld>
             <a:endParaRPr lang="es-VE"/>
           </a:p>
@@ -1021,7 +1021,7 @@
           <a:p>
             <a:fld id="{823E8A56-526A-4CC4-96EA-C5813A8209A1}" type="datetimeFigureOut">
               <a:rPr lang="es-VE" smtClean="0"/>
-              <a:t>18/4/2023</a:t>
+              <a:t>18/7/2023</a:t>
             </a:fld>
             <a:endParaRPr lang="es-VE"/>
           </a:p>
@@ -1191,7 +1191,7 @@
           <a:p>
             <a:fld id="{823E8A56-526A-4CC4-96EA-C5813A8209A1}" type="datetimeFigureOut">
               <a:rPr lang="es-VE" smtClean="0"/>
-              <a:t>18/4/2023</a:t>
+              <a:t>18/7/2023</a:t>
             </a:fld>
             <a:endParaRPr lang="es-VE"/>
           </a:p>
@@ -1437,7 +1437,7 @@
           <a:p>
             <a:fld id="{823E8A56-526A-4CC4-96EA-C5813A8209A1}" type="datetimeFigureOut">
               <a:rPr lang="es-VE" smtClean="0"/>
-              <a:t>18/4/2023</a:t>
+              <a:t>18/7/2023</a:t>
             </a:fld>
             <a:endParaRPr lang="es-VE"/>
           </a:p>
@@ -1725,7 +1725,7 @@
           <a:p>
             <a:fld id="{823E8A56-526A-4CC4-96EA-C5813A8209A1}" type="datetimeFigureOut">
               <a:rPr lang="es-VE" smtClean="0"/>
-              <a:t>18/4/2023</a:t>
+              <a:t>18/7/2023</a:t>
             </a:fld>
             <a:endParaRPr lang="es-VE"/>
           </a:p>
@@ -2147,7 +2147,7 @@
           <a:p>
             <a:fld id="{823E8A56-526A-4CC4-96EA-C5813A8209A1}" type="datetimeFigureOut">
               <a:rPr lang="es-VE" smtClean="0"/>
-              <a:t>18/4/2023</a:t>
+              <a:t>18/7/2023</a:t>
             </a:fld>
             <a:endParaRPr lang="es-VE"/>
           </a:p>
@@ -2265,7 +2265,7 @@
           <a:p>
             <a:fld id="{823E8A56-526A-4CC4-96EA-C5813A8209A1}" type="datetimeFigureOut">
               <a:rPr lang="es-VE" smtClean="0"/>
-              <a:t>18/4/2023</a:t>
+              <a:t>18/7/2023</a:t>
             </a:fld>
             <a:endParaRPr lang="es-VE"/>
           </a:p>
@@ -2360,7 +2360,7 @@
           <a:p>
             <a:fld id="{823E8A56-526A-4CC4-96EA-C5813A8209A1}" type="datetimeFigureOut">
               <a:rPr lang="es-VE" smtClean="0"/>
-              <a:t>18/4/2023</a:t>
+              <a:t>18/7/2023</a:t>
             </a:fld>
             <a:endParaRPr lang="es-VE"/>
           </a:p>
@@ -2637,7 +2637,7 @@
           <a:p>
             <a:fld id="{823E8A56-526A-4CC4-96EA-C5813A8209A1}" type="datetimeFigureOut">
               <a:rPr lang="es-VE" smtClean="0"/>
-              <a:t>18/4/2023</a:t>
+              <a:t>18/7/2023</a:t>
             </a:fld>
             <a:endParaRPr lang="es-VE"/>
           </a:p>
@@ -2890,7 +2890,7 @@
           <a:p>
             <a:fld id="{823E8A56-526A-4CC4-96EA-C5813A8209A1}" type="datetimeFigureOut">
               <a:rPr lang="es-VE" smtClean="0"/>
-              <a:t>18/4/2023</a:t>
+              <a:t>18/7/2023</a:t>
             </a:fld>
             <a:endParaRPr lang="es-VE"/>
           </a:p>
@@ -3103,7 +3103,7 @@
           <a:p>
             <a:fld id="{823E8A56-526A-4CC4-96EA-C5813A8209A1}" type="datetimeFigureOut">
               <a:rPr lang="es-VE" smtClean="0"/>
-              <a:t>18/4/2023</a:t>
+              <a:t>18/7/2023</a:t>
             </a:fld>
             <a:endParaRPr lang="es-VE"/>
           </a:p>
@@ -3525,7 +3525,8 @@
                 <a:solidFill>
                   <a:schemeClr val="bg1"/>
                 </a:solidFill>
-                <a:latin typeface="Ubuntu" panose="020B0504030602030204" pitchFamily="34" charset="0"/>
+                <a:latin typeface="Arial" panose="020B0604020202020204" pitchFamily="34" charset="0"/>
+                <a:cs typeface="Arial" panose="020B0604020202020204" pitchFamily="34" charset="0"/>
               </a:rPr>
               <a:t>Programación Web</a:t>
             </a:r>
@@ -3533,7 +3534,8 @@
               <a:solidFill>
                 <a:schemeClr val="bg1"/>
               </a:solidFill>
-              <a:latin typeface="Ubuntu" panose="020B0504030602030204" pitchFamily="34" charset="0"/>
+              <a:latin typeface="Arial" panose="020B0604020202020204" pitchFamily="34" charset="0"/>
+              <a:cs typeface="Arial" panose="020B0604020202020204" pitchFamily="34" charset="0"/>
             </a:endParaRPr>
           </a:p>
         </p:txBody>
@@ -3565,7 +3567,8 @@
                 <a:solidFill>
                   <a:schemeClr val="bg1"/>
                 </a:solidFill>
-                <a:latin typeface="Ubuntu" panose="020B0504030602030204" pitchFamily="34" charset="0"/>
+                <a:latin typeface="Arial" panose="020B0604020202020204" pitchFamily="34" charset="0"/>
+                <a:cs typeface="Arial" panose="020B0604020202020204" pitchFamily="34" charset="0"/>
               </a:rPr>
               <a:t>Módulo 1</a:t>
             </a:r>
@@ -3573,7 +3576,8 @@
               <a:solidFill>
                 <a:schemeClr val="bg1"/>
               </a:solidFill>
-              <a:latin typeface="Ubuntu" panose="020B0504030602030204" pitchFamily="34" charset="0"/>
+              <a:latin typeface="Arial" panose="020B0604020202020204" pitchFamily="34" charset="0"/>
+              <a:cs typeface="Arial" panose="020B0604020202020204" pitchFamily="34" charset="0"/>
             </a:endParaRPr>
           </a:p>
         </p:txBody>
@@ -3674,7 +3678,7 @@
         <p:spPr>
           <a:xfrm>
             <a:off x="899592" y="836712"/>
-            <a:ext cx="1015021" cy="523220"/>
+            <a:ext cx="1064715" cy="523220"/>
           </a:xfrm>
           <a:prstGeom prst="rect">
             <a:avLst/>
@@ -3692,7 +3696,8 @@
                 <a:solidFill>
                   <a:schemeClr val="bg1"/>
                 </a:solidFill>
-                <a:latin typeface="Ubuntu" panose="020B0504030602030204" pitchFamily="34" charset="0"/>
+                <a:latin typeface="Arial" panose="020B0604020202020204" pitchFamily="34" charset="0"/>
+                <a:cs typeface="Arial" panose="020B0604020202020204" pitchFamily="34" charset="0"/>
               </a:rPr>
               <a:t>Rosa</a:t>
             </a:r>
@@ -3730,7 +3735,8 @@
                 <a:solidFill>
                   <a:schemeClr val="bg1"/>
                 </a:solidFill>
-                <a:latin typeface="Ubuntu" panose="020B0504030602030204" pitchFamily="34" charset="0"/>
+                <a:latin typeface="Arial" panose="020B0604020202020204" pitchFamily="34" charset="0"/>
+                <a:cs typeface="Arial" panose="020B0604020202020204" pitchFamily="34" charset="0"/>
               </a:rPr>
               <a:t>Trayente principalmente al público femenino</a:t>
             </a:r>
@@ -3748,7 +3754,8 @@
                 <a:solidFill>
                   <a:schemeClr val="bg1"/>
                 </a:solidFill>
-                <a:latin typeface="Ubuntu" panose="020B0504030602030204" pitchFamily="34" charset="0"/>
+                <a:latin typeface="Arial" panose="020B0604020202020204" pitchFamily="34" charset="0"/>
+                <a:cs typeface="Arial" panose="020B0604020202020204" pitchFamily="34" charset="0"/>
               </a:rPr>
               <a:t>D</a:t>
             </a:r>
@@ -3757,7 +3764,8 @@
                 <a:solidFill>
                   <a:schemeClr val="bg1"/>
                 </a:solidFill>
-                <a:latin typeface="Ubuntu" panose="020B0504030602030204" pitchFamily="34" charset="0"/>
+                <a:latin typeface="Arial" panose="020B0604020202020204" pitchFamily="34" charset="0"/>
+                <a:cs typeface="Arial" panose="020B0604020202020204" pitchFamily="34" charset="0"/>
               </a:rPr>
               <a:t>elicado </a:t>
             </a:r>
@@ -3775,7 +3783,8 @@
                 <a:solidFill>
                   <a:schemeClr val="bg1"/>
                 </a:solidFill>
-                <a:latin typeface="Ubuntu" panose="020B0504030602030204" pitchFamily="34" charset="0"/>
+                <a:latin typeface="Arial" panose="020B0604020202020204" pitchFamily="34" charset="0"/>
+                <a:cs typeface="Arial" panose="020B0604020202020204" pitchFamily="34" charset="0"/>
               </a:rPr>
               <a:t>Romántico</a:t>
             </a:r>
@@ -3793,7 +3802,8 @@
                 <a:solidFill>
                   <a:schemeClr val="bg1"/>
                 </a:solidFill>
-                <a:latin typeface="Ubuntu" panose="020B0504030602030204" pitchFamily="34" charset="0"/>
+                <a:latin typeface="Arial" panose="020B0604020202020204" pitchFamily="34" charset="0"/>
+                <a:cs typeface="Arial" panose="020B0604020202020204" pitchFamily="34" charset="0"/>
               </a:rPr>
               <a:t>Inocencia</a:t>
             </a:r>
@@ -3811,7 +3821,8 @@
                 <a:solidFill>
                   <a:schemeClr val="bg1"/>
                 </a:solidFill>
-                <a:latin typeface="Ubuntu" panose="020B0504030602030204" pitchFamily="34" charset="0"/>
+                <a:latin typeface="Arial" panose="020B0604020202020204" pitchFamily="34" charset="0"/>
+                <a:cs typeface="Arial" panose="020B0604020202020204" pitchFamily="34" charset="0"/>
               </a:rPr>
               <a:t>Infancia</a:t>
             </a:r>
@@ -3829,7 +3840,8 @@
                 <a:solidFill>
                   <a:schemeClr val="bg1"/>
                 </a:solidFill>
-                <a:latin typeface="Ubuntu" panose="020B0504030602030204" pitchFamily="34" charset="0"/>
+                <a:latin typeface="Arial" panose="020B0604020202020204" pitchFamily="34" charset="0"/>
+                <a:cs typeface="Arial" panose="020B0604020202020204" pitchFamily="34" charset="0"/>
               </a:rPr>
               <a:t>Comodidad</a:t>
             </a:r>
@@ -3837,7 +3849,8 @@
               <a:solidFill>
                 <a:schemeClr val="bg1"/>
               </a:solidFill>
-              <a:latin typeface="Ubuntu" panose="020B0504030602030204" pitchFamily="34" charset="0"/>
+              <a:latin typeface="Arial" panose="020B0604020202020204" pitchFamily="34" charset="0"/>
+              <a:cs typeface="Arial" panose="020B0604020202020204" pitchFamily="34" charset="0"/>
             </a:endParaRPr>
           </a:p>
         </p:txBody>
@@ -4016,7 +4029,7 @@
         <p:spPr>
           <a:xfrm>
             <a:off x="899592" y="836712"/>
-            <a:ext cx="1015021" cy="523220"/>
+            <a:ext cx="1064715" cy="523220"/>
           </a:xfrm>
           <a:prstGeom prst="rect">
             <a:avLst/>
@@ -4034,7 +4047,8 @@
                 <a:solidFill>
                   <a:schemeClr val="bg1"/>
                 </a:solidFill>
-                <a:latin typeface="Ubuntu" panose="020B0504030602030204" pitchFamily="34" charset="0"/>
+                <a:latin typeface="Arial" panose="020B0604020202020204" pitchFamily="34" charset="0"/>
+                <a:cs typeface="Arial" panose="020B0604020202020204" pitchFamily="34" charset="0"/>
               </a:rPr>
               <a:t>Rosa</a:t>
             </a:r>
@@ -4164,7 +4178,8 @@
                 <a:solidFill>
                   <a:schemeClr val="bg1"/>
                 </a:solidFill>
-                <a:latin typeface="Ubuntu" panose="020B0504030602030204" pitchFamily="34" charset="0"/>
+                <a:latin typeface="Arial" panose="020B0604020202020204" pitchFamily="34" charset="0"/>
+                <a:cs typeface="Arial" panose="020B0604020202020204" pitchFamily="34" charset="0"/>
               </a:rPr>
               <a:t>Azul</a:t>
             </a:r>
@@ -4205,7 +4220,8 @@
                 <a:solidFill>
                   <a:schemeClr val="bg1"/>
                 </a:solidFill>
-                <a:latin typeface="Ubuntu" panose="020B0504030602030204" pitchFamily="34" charset="0"/>
+                <a:latin typeface="Arial" panose="020B0604020202020204" pitchFamily="34" charset="0"/>
+                <a:cs typeface="Arial" panose="020B0604020202020204" pitchFamily="34" charset="0"/>
               </a:rPr>
               <a:t>Formalidad</a:t>
             </a:r>
@@ -4223,7 +4239,8 @@
                 <a:solidFill>
                   <a:schemeClr val="bg1"/>
                 </a:solidFill>
-                <a:latin typeface="Ubuntu" panose="020B0504030602030204" pitchFamily="34" charset="0"/>
+                <a:latin typeface="Arial" panose="020B0604020202020204" pitchFamily="34" charset="0"/>
+                <a:cs typeface="Arial" panose="020B0604020202020204" pitchFamily="34" charset="0"/>
               </a:rPr>
               <a:t>Serenidad</a:t>
             </a:r>
@@ -4241,7 +4258,8 @@
                 <a:solidFill>
                   <a:schemeClr val="bg1"/>
                 </a:solidFill>
-                <a:latin typeface="Ubuntu" panose="020B0504030602030204" pitchFamily="34" charset="0"/>
+                <a:latin typeface="Arial" panose="020B0604020202020204" pitchFamily="34" charset="0"/>
+                <a:cs typeface="Arial" panose="020B0604020202020204" pitchFamily="34" charset="0"/>
               </a:rPr>
               <a:t>Calma</a:t>
             </a:r>
@@ -4259,7 +4277,8 @@
                 <a:solidFill>
                   <a:schemeClr val="bg1"/>
                 </a:solidFill>
-                <a:latin typeface="Ubuntu" panose="020B0504030602030204" pitchFamily="34" charset="0"/>
+                <a:latin typeface="Arial" panose="020B0604020202020204" pitchFamily="34" charset="0"/>
+                <a:cs typeface="Arial" panose="020B0604020202020204" pitchFamily="34" charset="0"/>
               </a:rPr>
               <a:t>Frialdad</a:t>
             </a:r>
@@ -4277,7 +4296,8 @@
                 <a:solidFill>
                   <a:schemeClr val="bg1"/>
                 </a:solidFill>
-                <a:latin typeface="Ubuntu" panose="020B0504030602030204" pitchFamily="34" charset="0"/>
+                <a:latin typeface="Arial" panose="020B0604020202020204" pitchFamily="34" charset="0"/>
+                <a:cs typeface="Arial" panose="020B0604020202020204" pitchFamily="34" charset="0"/>
               </a:rPr>
               <a:t>C</a:t>
             </a:r>
@@ -4286,7 +4306,8 @@
                 <a:solidFill>
                   <a:schemeClr val="bg1"/>
                 </a:solidFill>
-                <a:latin typeface="Ubuntu" panose="020B0504030602030204" pitchFamily="34" charset="0"/>
+                <a:latin typeface="Arial" panose="020B0604020202020204" pitchFamily="34" charset="0"/>
+                <a:cs typeface="Arial" panose="020B0604020202020204" pitchFamily="34" charset="0"/>
               </a:rPr>
               <a:t>onfianza</a:t>
             </a:r>
@@ -4294,7 +4315,8 @@
               <a:solidFill>
                 <a:schemeClr val="bg1"/>
               </a:solidFill>
-              <a:latin typeface="Ubuntu" panose="020B0504030602030204" pitchFamily="34" charset="0"/>
+              <a:latin typeface="Arial" panose="020B0604020202020204" pitchFamily="34" charset="0"/>
+              <a:cs typeface="Arial" panose="020B0604020202020204" pitchFamily="34" charset="0"/>
             </a:endParaRPr>
           </a:p>
         </p:txBody>
@@ -4491,7 +4513,8 @@
                 <a:solidFill>
                   <a:schemeClr val="bg1"/>
                 </a:solidFill>
-                <a:latin typeface="Ubuntu" panose="020B0504030602030204" pitchFamily="34" charset="0"/>
+                <a:latin typeface="Arial" panose="020B0604020202020204" pitchFamily="34" charset="0"/>
+                <a:cs typeface="Arial" panose="020B0604020202020204" pitchFamily="34" charset="0"/>
               </a:rPr>
               <a:t>Azul</a:t>
             </a:r>
@@ -4623,7 +4646,8 @@
                 <a:solidFill>
                   <a:schemeClr val="bg1"/>
                 </a:solidFill>
-                <a:latin typeface="Ubuntu" panose="020B0504030602030204" pitchFamily="34" charset="0"/>
+                <a:latin typeface="Arial" panose="020B0604020202020204" pitchFamily="34" charset="0"/>
+                <a:cs typeface="Arial" panose="020B0604020202020204" pitchFamily="34" charset="0"/>
               </a:rPr>
               <a:t>Morado</a:t>
             </a:r>
@@ -4664,7 +4688,8 @@
                 <a:solidFill>
                   <a:schemeClr val="bg1"/>
                 </a:solidFill>
-                <a:latin typeface="Ubuntu" panose="020B0504030602030204" pitchFamily="34" charset="0"/>
+                <a:latin typeface="Arial" panose="020B0604020202020204" pitchFamily="34" charset="0"/>
+                <a:cs typeface="Arial" panose="020B0604020202020204" pitchFamily="34" charset="0"/>
               </a:rPr>
               <a:t>Lujo</a:t>
             </a:r>
@@ -4682,7 +4707,8 @@
                 <a:solidFill>
                   <a:schemeClr val="bg1"/>
                 </a:solidFill>
-                <a:latin typeface="Ubuntu" panose="020B0504030602030204" pitchFamily="34" charset="0"/>
+                <a:latin typeface="Arial" panose="020B0604020202020204" pitchFamily="34" charset="0"/>
+                <a:cs typeface="Arial" panose="020B0604020202020204" pitchFamily="34" charset="0"/>
               </a:rPr>
               <a:t>Misterio</a:t>
             </a:r>
@@ -4700,7 +4726,8 @@
                 <a:solidFill>
                   <a:schemeClr val="bg1"/>
                 </a:solidFill>
-                <a:latin typeface="Ubuntu" panose="020B0504030602030204" pitchFamily="34" charset="0"/>
+                <a:latin typeface="Arial" panose="020B0604020202020204" pitchFamily="34" charset="0"/>
+                <a:cs typeface="Arial" panose="020B0604020202020204" pitchFamily="34" charset="0"/>
               </a:rPr>
               <a:t>Creatividad</a:t>
             </a:r>
@@ -4718,7 +4745,8 @@
                 <a:solidFill>
                   <a:schemeClr val="bg1"/>
                 </a:solidFill>
-                <a:latin typeface="Ubuntu" panose="020B0504030602030204" pitchFamily="34" charset="0"/>
+                <a:latin typeface="Arial" panose="020B0604020202020204" pitchFamily="34" charset="0"/>
+                <a:cs typeface="Arial" panose="020B0604020202020204" pitchFamily="34" charset="0"/>
               </a:rPr>
               <a:t>Autenticidad</a:t>
             </a:r>
@@ -4736,7 +4764,8 @@
                 <a:solidFill>
                   <a:schemeClr val="bg1"/>
                 </a:solidFill>
-                <a:latin typeface="Ubuntu" panose="020B0504030602030204" pitchFamily="34" charset="0"/>
+                <a:latin typeface="Arial" panose="020B0604020202020204" pitchFamily="34" charset="0"/>
+                <a:cs typeface="Arial" panose="020B0604020202020204" pitchFamily="34" charset="0"/>
               </a:rPr>
               <a:t>Espiritualismo </a:t>
             </a:r>
@@ -4744,7 +4773,8 @@
               <a:solidFill>
                 <a:schemeClr val="bg1"/>
               </a:solidFill>
-              <a:latin typeface="Ubuntu" panose="020B0504030602030204" pitchFamily="34" charset="0"/>
+              <a:latin typeface="Arial" panose="020B0604020202020204" pitchFamily="34" charset="0"/>
+              <a:cs typeface="Arial" panose="020B0604020202020204" pitchFamily="34" charset="0"/>
             </a:endParaRPr>
           </a:p>
         </p:txBody>
@@ -4942,8 +4972,8 @@
         </p:nvSpPr>
         <p:spPr>
           <a:xfrm>
-            <a:off x="899592" y="836712"/>
-            <a:ext cx="949299" cy="523220"/>
+            <a:off x="467544" y="822524"/>
+            <a:ext cx="1510350" cy="523220"/>
           </a:xfrm>
           <a:prstGeom prst="rect">
             <a:avLst/>
@@ -4961,10 +4991,18 @@
                 <a:solidFill>
                   <a:schemeClr val="bg1"/>
                 </a:solidFill>
-                <a:latin typeface="Ubuntu" panose="020B0504030602030204" pitchFamily="34" charset="0"/>
-              </a:rPr>
-              <a:t>Azul</a:t>
-            </a:r>
+                <a:latin typeface="Arial" panose="020B0604020202020204" pitchFamily="34" charset="0"/>
+                <a:cs typeface="Arial" panose="020B0604020202020204" pitchFamily="34" charset="0"/>
+              </a:rPr>
+              <a:t>Morado</a:t>
+            </a:r>
+            <a:endParaRPr lang="es-MX" sz="2800" b="1" dirty="0" smtClean="0">
+              <a:solidFill>
+                <a:schemeClr val="bg1"/>
+              </a:solidFill>
+              <a:latin typeface="Arial" panose="020B0604020202020204" pitchFamily="34" charset="0"/>
+              <a:cs typeface="Arial" panose="020B0604020202020204" pitchFamily="34" charset="0"/>
+            </a:endParaRPr>
           </a:p>
         </p:txBody>
       </p:sp>
@@ -5075,7 +5113,7 @@
         <p:spPr>
           <a:xfrm>
             <a:off x="671697" y="764704"/>
-            <a:ext cx="963725" cy="523220"/>
+            <a:ext cx="982961" cy="523220"/>
           </a:xfrm>
           <a:prstGeom prst="rect">
             <a:avLst/>
@@ -5093,7 +5131,8 @@
                 <a:solidFill>
                   <a:schemeClr val="bg1"/>
                 </a:solidFill>
-                <a:latin typeface="Ubuntu" panose="020B0504030602030204" pitchFamily="34" charset="0"/>
+                <a:latin typeface="Arial" panose="020B0604020202020204" pitchFamily="34" charset="0"/>
+                <a:cs typeface="Arial" panose="020B0604020202020204" pitchFamily="34" charset="0"/>
               </a:rPr>
               <a:t>Rojo</a:t>
             </a:r>
@@ -5134,7 +5173,8 @@
                 <a:solidFill>
                   <a:schemeClr val="bg1"/>
                 </a:solidFill>
-                <a:latin typeface="Ubuntu" panose="020B0504030602030204" pitchFamily="34" charset="0"/>
+                <a:latin typeface="Arial" panose="020B0604020202020204" pitchFamily="34" charset="0"/>
+                <a:cs typeface="Arial" panose="020B0604020202020204" pitchFamily="34" charset="0"/>
               </a:rPr>
               <a:t>Impresión</a:t>
             </a:r>
@@ -5152,7 +5192,8 @@
                 <a:solidFill>
                   <a:schemeClr val="bg1"/>
                 </a:solidFill>
-                <a:latin typeface="Ubuntu" panose="020B0504030602030204" pitchFamily="34" charset="0"/>
+                <a:latin typeface="Arial" panose="020B0604020202020204" pitchFamily="34" charset="0"/>
+                <a:cs typeface="Arial" panose="020B0604020202020204" pitchFamily="34" charset="0"/>
               </a:rPr>
               <a:t>Agresividad</a:t>
             </a:r>
@@ -5170,7 +5211,8 @@
                 <a:solidFill>
                   <a:schemeClr val="bg1"/>
                 </a:solidFill>
-                <a:latin typeface="Ubuntu" panose="020B0504030602030204" pitchFamily="34" charset="0"/>
+                <a:latin typeface="Arial" panose="020B0604020202020204" pitchFamily="34" charset="0"/>
+                <a:cs typeface="Arial" panose="020B0604020202020204" pitchFamily="34" charset="0"/>
               </a:rPr>
               <a:t>Impulsividad</a:t>
             </a:r>
@@ -5188,7 +5230,8 @@
                 <a:solidFill>
                   <a:schemeClr val="bg1"/>
                 </a:solidFill>
-                <a:latin typeface="Ubuntu" panose="020B0504030602030204" pitchFamily="34" charset="0"/>
+                <a:latin typeface="Arial" panose="020B0604020202020204" pitchFamily="34" charset="0"/>
+                <a:cs typeface="Arial" panose="020B0604020202020204" pitchFamily="34" charset="0"/>
               </a:rPr>
               <a:t>Energía</a:t>
             </a:r>
@@ -5206,7 +5249,8 @@
                 <a:solidFill>
                   <a:schemeClr val="bg1"/>
                 </a:solidFill>
-                <a:latin typeface="Ubuntu" panose="020B0504030602030204" pitchFamily="34" charset="0"/>
+                <a:latin typeface="Arial" panose="020B0604020202020204" pitchFamily="34" charset="0"/>
+                <a:cs typeface="Arial" panose="020B0604020202020204" pitchFamily="34" charset="0"/>
               </a:rPr>
               <a:t>Peligro</a:t>
             </a:r>
@@ -5224,7 +5268,8 @@
                 <a:solidFill>
                   <a:schemeClr val="bg1"/>
                 </a:solidFill>
-                <a:latin typeface="Ubuntu" panose="020B0504030602030204" pitchFamily="34" charset="0"/>
+                <a:latin typeface="Arial" panose="020B0604020202020204" pitchFamily="34" charset="0"/>
+                <a:cs typeface="Arial" panose="020B0604020202020204" pitchFamily="34" charset="0"/>
               </a:rPr>
               <a:t>Tomar acción</a:t>
             </a:r>
@@ -5232,7 +5277,8 @@
               <a:solidFill>
                 <a:schemeClr val="bg1"/>
               </a:solidFill>
-              <a:latin typeface="Ubuntu" panose="020B0504030602030204" pitchFamily="34" charset="0"/>
+              <a:latin typeface="Arial" panose="020B0604020202020204" pitchFamily="34" charset="0"/>
+              <a:cs typeface="Arial" panose="020B0604020202020204" pitchFamily="34" charset="0"/>
             </a:endParaRPr>
           </a:p>
         </p:txBody>
@@ -5411,7 +5457,7 @@
         <p:spPr>
           <a:xfrm>
             <a:off x="649316" y="503094"/>
-            <a:ext cx="963725" cy="523220"/>
+            <a:ext cx="982961" cy="523220"/>
           </a:xfrm>
           <a:prstGeom prst="rect">
             <a:avLst/>
@@ -5429,7 +5475,8 @@
                 <a:solidFill>
                   <a:schemeClr val="bg1"/>
                 </a:solidFill>
-                <a:latin typeface="Ubuntu" panose="020B0504030602030204" pitchFamily="34" charset="0"/>
+                <a:latin typeface="Arial" panose="020B0604020202020204" pitchFamily="34" charset="0"/>
+                <a:cs typeface="Arial" panose="020B0604020202020204" pitchFamily="34" charset="0"/>
               </a:rPr>
               <a:t>Rojo</a:t>
             </a:r>
@@ -5561,7 +5608,8 @@
                 <a:solidFill>
                   <a:schemeClr val="bg1"/>
                 </a:solidFill>
-                <a:latin typeface="Ubuntu" panose="020B0504030602030204" pitchFamily="34" charset="0"/>
+                <a:latin typeface="Arial" panose="020B0604020202020204" pitchFamily="34" charset="0"/>
+                <a:cs typeface="Arial" panose="020B0604020202020204" pitchFamily="34" charset="0"/>
               </a:rPr>
               <a:t>Naranja</a:t>
             </a:r>
@@ -5602,7 +5650,8 @@
                 <a:solidFill>
                   <a:schemeClr val="bg1"/>
                 </a:solidFill>
-                <a:latin typeface="Ubuntu" panose="020B0504030602030204" pitchFamily="34" charset="0"/>
+                <a:latin typeface="Arial" panose="020B0604020202020204" pitchFamily="34" charset="0"/>
+                <a:cs typeface="Arial" panose="020B0604020202020204" pitchFamily="34" charset="0"/>
               </a:rPr>
               <a:t>Sustituye al rojo</a:t>
             </a:r>
@@ -5620,7 +5669,8 @@
                 <a:solidFill>
                   <a:schemeClr val="bg1"/>
                 </a:solidFill>
-                <a:latin typeface="Ubuntu" panose="020B0504030602030204" pitchFamily="34" charset="0"/>
+                <a:latin typeface="Arial" panose="020B0604020202020204" pitchFamily="34" charset="0"/>
+                <a:cs typeface="Arial" panose="020B0604020202020204" pitchFamily="34" charset="0"/>
               </a:rPr>
               <a:t>Vitalidad</a:t>
             </a:r>
@@ -5638,7 +5688,8 @@
                 <a:solidFill>
                   <a:schemeClr val="bg1"/>
                 </a:solidFill>
-                <a:latin typeface="Ubuntu" panose="020B0504030602030204" pitchFamily="34" charset="0"/>
+                <a:latin typeface="Arial" panose="020B0604020202020204" pitchFamily="34" charset="0"/>
+                <a:cs typeface="Arial" panose="020B0604020202020204" pitchFamily="34" charset="0"/>
               </a:rPr>
               <a:t>Creatividad</a:t>
             </a:r>
@@ -5656,7 +5707,8 @@
                 <a:solidFill>
                   <a:schemeClr val="bg1"/>
                 </a:solidFill>
-                <a:latin typeface="Ubuntu" panose="020B0504030602030204" pitchFamily="34" charset="0"/>
+                <a:latin typeface="Arial" panose="020B0604020202020204" pitchFamily="34" charset="0"/>
+                <a:cs typeface="Arial" panose="020B0604020202020204" pitchFamily="34" charset="0"/>
               </a:rPr>
               <a:t>Carisma</a:t>
             </a:r>
@@ -5674,7 +5726,8 @@
                 <a:solidFill>
                   <a:schemeClr val="bg1"/>
                 </a:solidFill>
-                <a:latin typeface="Ubuntu" panose="020B0504030602030204" pitchFamily="34" charset="0"/>
+                <a:latin typeface="Arial" panose="020B0604020202020204" pitchFamily="34" charset="0"/>
+                <a:cs typeface="Arial" panose="020B0604020202020204" pitchFamily="34" charset="0"/>
               </a:rPr>
               <a:t>Moderno</a:t>
             </a:r>
@@ -5692,7 +5745,8 @@
                 <a:solidFill>
                   <a:schemeClr val="bg1"/>
                 </a:solidFill>
-                <a:latin typeface="Ubuntu" panose="020B0504030602030204" pitchFamily="34" charset="0"/>
+                <a:latin typeface="Arial" panose="020B0604020202020204" pitchFamily="34" charset="0"/>
+                <a:cs typeface="Arial" panose="020B0604020202020204" pitchFamily="34" charset="0"/>
               </a:rPr>
               <a:t>Divertido</a:t>
             </a:r>
@@ -5710,7 +5764,8 @@
                 <a:solidFill>
                   <a:schemeClr val="bg1"/>
                 </a:solidFill>
-                <a:latin typeface="Ubuntu" panose="020B0504030602030204" pitchFamily="34" charset="0"/>
+                <a:latin typeface="Arial" panose="020B0604020202020204" pitchFamily="34" charset="0"/>
+                <a:cs typeface="Arial" panose="020B0604020202020204" pitchFamily="34" charset="0"/>
               </a:rPr>
               <a:t>Tomar acción</a:t>
             </a:r>
@@ -5718,7 +5773,8 @@
               <a:solidFill>
                 <a:schemeClr val="bg1"/>
               </a:solidFill>
-              <a:latin typeface="Ubuntu" panose="020B0504030602030204" pitchFamily="34" charset="0"/>
+              <a:latin typeface="Arial" panose="020B0604020202020204" pitchFamily="34" charset="0"/>
+              <a:cs typeface="Arial" panose="020B0604020202020204" pitchFamily="34" charset="0"/>
             </a:endParaRPr>
           </a:p>
         </p:txBody>
@@ -5915,7 +5971,8 @@
                 <a:solidFill>
                   <a:schemeClr val="bg1"/>
                 </a:solidFill>
-                <a:latin typeface="Ubuntu" panose="020B0504030602030204" pitchFamily="34" charset="0"/>
+                <a:latin typeface="Arial" panose="020B0604020202020204" pitchFamily="34" charset="0"/>
+                <a:cs typeface="Arial" panose="020B0604020202020204" pitchFamily="34" charset="0"/>
               </a:rPr>
               <a:t>Naranja</a:t>
             </a:r>
@@ -6028,8 +6085,8 @@
         </p:nvSpPr>
         <p:spPr>
           <a:xfrm>
-            <a:off x="893750" y="2705725"/>
-            <a:ext cx="7356501" cy="1446550"/>
+            <a:off x="467544" y="2060848"/>
+            <a:ext cx="7854714" cy="2800767"/>
           </a:xfrm>
           <a:prstGeom prst="rect">
             <a:avLst/>
@@ -6037,29 +6094,41 @@
           <a:noFill/>
         </p:spPr>
         <p:txBody>
-          <a:bodyPr wrap="none" rtlCol="0">
+          <a:bodyPr wrap="square" rtlCol="0">
             <a:spAutoFit/>
           </a:bodyPr>
           <a:lstStyle/>
           <a:p>
+            <a:pPr algn="ctr"/>
             <a:r>
               <a:rPr lang="es-MX" sz="8800" dirty="0" smtClean="0">
                 <a:solidFill>
                   <a:schemeClr val="bg1"/>
                 </a:solidFill>
-                <a:latin typeface="Futurama" pitchFamily="2" charset="0"/>
+                <a:latin typeface="Arial" panose="020B0604020202020204" pitchFamily="34" charset="0"/>
                 <a:ea typeface="Futura" panose="02020800000000000000" pitchFamily="18" charset="0"/>
-                <a:cs typeface="Futura" panose="02020800000000000000" pitchFamily="18" charset="0"/>
-              </a:rPr>
-              <a:t>Espacio de Trabajo</a:t>
+                <a:cs typeface="Arial" panose="020B0604020202020204" pitchFamily="34" charset="0"/>
+              </a:rPr>
+              <a:t>Espacio de </a:t>
+            </a:r>
+            <a:r>
+              <a:rPr lang="es-MX" sz="8800" dirty="0" smtClean="0">
+                <a:solidFill>
+                  <a:schemeClr val="bg1"/>
+                </a:solidFill>
+                <a:latin typeface="Arial" panose="020B0604020202020204" pitchFamily="34" charset="0"/>
+                <a:ea typeface="Futura" panose="02020800000000000000" pitchFamily="18" charset="0"/>
+                <a:cs typeface="Arial" panose="020B0604020202020204" pitchFamily="34" charset="0"/>
+              </a:rPr>
+              <a:t>Trabajo</a:t>
             </a:r>
             <a:endParaRPr lang="es-VE" sz="8800" dirty="0">
               <a:solidFill>
                 <a:schemeClr val="bg1"/>
               </a:solidFill>
-              <a:latin typeface="Futurama" pitchFamily="2" charset="0"/>
+              <a:latin typeface="Arial" panose="020B0604020202020204" pitchFamily="34" charset="0"/>
               <a:ea typeface="Futura" panose="02020800000000000000" pitchFamily="18" charset="0"/>
-              <a:cs typeface="Futura" panose="02020800000000000000" pitchFamily="18" charset="0"/>
+              <a:cs typeface="Arial" panose="020B0604020202020204" pitchFamily="34" charset="0"/>
             </a:endParaRPr>
           </a:p>
         </p:txBody>
@@ -6148,7 +6217,8 @@
                 <a:solidFill>
                   <a:schemeClr val="bg1"/>
                 </a:solidFill>
-                <a:latin typeface="Ubuntu" panose="020B0504030602030204" pitchFamily="34" charset="0"/>
+                <a:latin typeface="Arial" panose="020B0604020202020204" pitchFamily="34" charset="0"/>
+                <a:cs typeface="Arial" panose="020B0604020202020204" pitchFamily="34" charset="0"/>
               </a:rPr>
               <a:t>Amarillo</a:t>
             </a:r>
@@ -6189,7 +6259,8 @@
                 <a:solidFill>
                   <a:schemeClr val="bg1"/>
                 </a:solidFill>
-                <a:latin typeface="Ubuntu" panose="020B0504030602030204" pitchFamily="34" charset="0"/>
+                <a:latin typeface="Arial" panose="020B0604020202020204" pitchFamily="34" charset="0"/>
+                <a:cs typeface="Arial" panose="020B0604020202020204" pitchFamily="34" charset="0"/>
               </a:rPr>
               <a:t>Público infantil</a:t>
             </a:r>
@@ -6207,7 +6278,8 @@
                 <a:solidFill>
                   <a:schemeClr val="bg1"/>
                 </a:solidFill>
-                <a:latin typeface="Ubuntu" panose="020B0504030602030204" pitchFamily="34" charset="0"/>
+                <a:latin typeface="Arial" panose="020B0604020202020204" pitchFamily="34" charset="0"/>
+                <a:cs typeface="Arial" panose="020B0604020202020204" pitchFamily="34" charset="0"/>
               </a:rPr>
               <a:t>Diversión</a:t>
             </a:r>
@@ -6225,7 +6297,8 @@
                 <a:solidFill>
                   <a:schemeClr val="bg1"/>
                 </a:solidFill>
-                <a:latin typeface="Ubuntu" panose="020B0504030602030204" pitchFamily="34" charset="0"/>
+                <a:latin typeface="Arial" panose="020B0604020202020204" pitchFamily="34" charset="0"/>
+                <a:cs typeface="Arial" panose="020B0604020202020204" pitchFamily="34" charset="0"/>
               </a:rPr>
               <a:t>Optimismo</a:t>
             </a:r>
@@ -6243,7 +6316,8 @@
                 <a:solidFill>
                   <a:schemeClr val="bg1"/>
                 </a:solidFill>
-                <a:latin typeface="Ubuntu" panose="020B0504030602030204" pitchFamily="34" charset="0"/>
+                <a:latin typeface="Arial" panose="020B0604020202020204" pitchFamily="34" charset="0"/>
+                <a:cs typeface="Arial" panose="020B0604020202020204" pitchFamily="34" charset="0"/>
               </a:rPr>
               <a:t>Alegría</a:t>
             </a:r>
@@ -6261,7 +6335,8 @@
                 <a:solidFill>
                   <a:schemeClr val="bg1"/>
                 </a:solidFill>
-                <a:latin typeface="Ubuntu" panose="020B0504030602030204" pitchFamily="34" charset="0"/>
+                <a:latin typeface="Arial" panose="020B0604020202020204" pitchFamily="34" charset="0"/>
+                <a:cs typeface="Arial" panose="020B0604020202020204" pitchFamily="34" charset="0"/>
               </a:rPr>
               <a:t>Comida Infantil</a:t>
             </a:r>
@@ -6276,7 +6351,8 @@
                 <a:solidFill>
                   <a:schemeClr val="bg1"/>
                 </a:solidFill>
-                <a:latin typeface="Ubuntu" panose="020B0504030602030204" pitchFamily="34" charset="0"/>
+                <a:latin typeface="Arial" panose="020B0604020202020204" pitchFamily="34" charset="0"/>
+                <a:cs typeface="Arial" panose="020B0604020202020204" pitchFamily="34" charset="0"/>
               </a:rPr>
               <a:t>Presente en Comida</a:t>
             </a:r>
@@ -6284,7 +6360,8 @@
               <a:solidFill>
                 <a:schemeClr val="bg1"/>
               </a:solidFill>
-              <a:latin typeface="Ubuntu" panose="020B0504030602030204" pitchFamily="34" charset="0"/>
+              <a:latin typeface="Arial" panose="020B0604020202020204" pitchFamily="34" charset="0"/>
+              <a:cs typeface="Arial" panose="020B0604020202020204" pitchFamily="34" charset="0"/>
             </a:endParaRPr>
           </a:p>
         </p:txBody>
@@ -6481,7 +6558,8 @@
                 <a:solidFill>
                   <a:schemeClr val="bg1"/>
                 </a:solidFill>
-                <a:latin typeface="Ubuntu" panose="020B0504030602030204" pitchFamily="34" charset="0"/>
+                <a:latin typeface="Arial" panose="020B0604020202020204" pitchFamily="34" charset="0"/>
+                <a:cs typeface="Arial" panose="020B0604020202020204" pitchFamily="34" charset="0"/>
               </a:rPr>
               <a:t>Amarillo</a:t>
             </a:r>
@@ -6595,7 +6673,7 @@
         <p:spPr>
           <a:xfrm>
             <a:off x="899592" y="836712"/>
-            <a:ext cx="1233030" cy="523220"/>
+            <a:ext cx="1163524" cy="523220"/>
           </a:xfrm>
           <a:prstGeom prst="rect">
             <a:avLst/>
@@ -6613,7 +6691,8 @@
                 <a:solidFill>
                   <a:schemeClr val="bg1"/>
                 </a:solidFill>
-                <a:latin typeface="Ubuntu" panose="020B0504030602030204" pitchFamily="34" charset="0"/>
+                <a:latin typeface="Arial" panose="020B0604020202020204" pitchFamily="34" charset="0"/>
+                <a:cs typeface="Arial" panose="020B0604020202020204" pitchFamily="34" charset="0"/>
               </a:rPr>
               <a:t>Verde</a:t>
             </a:r>
@@ -6651,7 +6730,8 @@
                 <a:solidFill>
                   <a:schemeClr val="bg1"/>
                 </a:solidFill>
-                <a:latin typeface="Ubuntu" panose="020B0504030602030204" pitchFamily="34" charset="0"/>
+                <a:latin typeface="Arial" panose="020B0604020202020204" pitchFamily="34" charset="0"/>
+                <a:cs typeface="Arial" panose="020B0604020202020204" pitchFamily="34" charset="0"/>
               </a:rPr>
               <a:t>Ecológico y relacionado al medio ambiente</a:t>
             </a:r>
@@ -6669,7 +6749,8 @@
                 <a:solidFill>
                   <a:schemeClr val="bg1"/>
                 </a:solidFill>
-                <a:latin typeface="Ubuntu" panose="020B0504030602030204" pitchFamily="34" charset="0"/>
+                <a:latin typeface="Arial" panose="020B0604020202020204" pitchFamily="34" charset="0"/>
+                <a:cs typeface="Arial" panose="020B0604020202020204" pitchFamily="34" charset="0"/>
               </a:rPr>
               <a:t>Crecimiento</a:t>
             </a:r>
@@ -6687,7 +6768,8 @@
                 <a:solidFill>
                   <a:schemeClr val="bg1"/>
                 </a:solidFill>
-                <a:latin typeface="Ubuntu" panose="020B0504030602030204" pitchFamily="34" charset="0"/>
+                <a:latin typeface="Arial" panose="020B0604020202020204" pitchFamily="34" charset="0"/>
+                <a:cs typeface="Arial" panose="020B0604020202020204" pitchFamily="34" charset="0"/>
               </a:rPr>
               <a:t>Orgánico</a:t>
             </a:r>
@@ -6705,7 +6787,8 @@
                 <a:solidFill>
                   <a:schemeClr val="bg1"/>
                 </a:solidFill>
-                <a:latin typeface="Ubuntu" panose="020B0504030602030204" pitchFamily="34" charset="0"/>
+                <a:latin typeface="Arial" panose="020B0604020202020204" pitchFamily="34" charset="0"/>
+                <a:cs typeface="Arial" panose="020B0604020202020204" pitchFamily="34" charset="0"/>
               </a:rPr>
               <a:t>Frescura</a:t>
             </a:r>
@@ -6723,7 +6806,8 @@
                 <a:solidFill>
                   <a:schemeClr val="bg1"/>
                 </a:solidFill>
-                <a:latin typeface="Ubuntu" panose="020B0504030602030204" pitchFamily="34" charset="0"/>
+                <a:latin typeface="Arial" panose="020B0604020202020204" pitchFamily="34" charset="0"/>
+                <a:cs typeface="Arial" panose="020B0604020202020204" pitchFamily="34" charset="0"/>
               </a:rPr>
               <a:t>Serenidad</a:t>
             </a:r>
@@ -6741,7 +6825,8 @@
                 <a:solidFill>
                   <a:schemeClr val="bg1"/>
                 </a:solidFill>
-                <a:latin typeface="Ubuntu" panose="020B0504030602030204" pitchFamily="34" charset="0"/>
+                <a:latin typeface="Arial" panose="020B0604020202020204" pitchFamily="34" charset="0"/>
+                <a:cs typeface="Arial" panose="020B0604020202020204" pitchFamily="34" charset="0"/>
               </a:rPr>
               <a:t>Salud</a:t>
             </a:r>
@@ -6759,7 +6844,8 @@
                 <a:solidFill>
                   <a:schemeClr val="bg1"/>
                 </a:solidFill>
-                <a:latin typeface="Ubuntu" panose="020B0504030602030204" pitchFamily="34" charset="0"/>
+                <a:latin typeface="Arial" panose="020B0604020202020204" pitchFamily="34" charset="0"/>
+                <a:cs typeface="Arial" panose="020B0604020202020204" pitchFamily="34" charset="0"/>
               </a:rPr>
               <a:t>Tranquilidad</a:t>
             </a:r>
@@ -6767,7 +6853,8 @@
               <a:solidFill>
                 <a:schemeClr val="bg1"/>
               </a:solidFill>
-              <a:latin typeface="Ubuntu" panose="020B0504030602030204" pitchFamily="34" charset="0"/>
+              <a:latin typeface="Arial" panose="020B0604020202020204" pitchFamily="34" charset="0"/>
+              <a:cs typeface="Arial" panose="020B0604020202020204" pitchFamily="34" charset="0"/>
             </a:endParaRPr>
           </a:p>
         </p:txBody>
@@ -6946,7 +7033,7 @@
         <p:spPr>
           <a:xfrm>
             <a:off x="755576" y="476672"/>
-            <a:ext cx="1233030" cy="523220"/>
+            <a:ext cx="1163524" cy="523220"/>
           </a:xfrm>
           <a:prstGeom prst="rect">
             <a:avLst/>
@@ -6964,7 +7051,8 @@
                 <a:solidFill>
                   <a:schemeClr val="bg1"/>
                 </a:solidFill>
-                <a:latin typeface="Ubuntu" panose="020B0504030602030204" pitchFamily="34" charset="0"/>
+                <a:latin typeface="Arial" panose="020B0604020202020204" pitchFamily="34" charset="0"/>
+                <a:cs typeface="Arial" panose="020B0604020202020204" pitchFamily="34" charset="0"/>
               </a:rPr>
               <a:t>Verde</a:t>
             </a:r>
@@ -7097,7 +7185,8 @@
                 <a:solidFill>
                   <a:schemeClr val="bg1"/>
                 </a:solidFill>
-                <a:latin typeface="Futurama" pitchFamily="2" charset="0"/>
+                <a:latin typeface="Arial" panose="020B0604020202020204" pitchFamily="34" charset="0"/>
+                <a:cs typeface="Arial" panose="020B0604020202020204" pitchFamily="34" charset="0"/>
               </a:rPr>
               <a:t>Tipografía y su elección</a:t>
             </a:r>
@@ -7105,7 +7194,8 @@
               <a:solidFill>
                 <a:schemeClr val="bg1"/>
               </a:solidFill>
-              <a:latin typeface="Futurama" pitchFamily="2" charset="0"/>
+              <a:latin typeface="Arial" panose="020B0604020202020204" pitchFamily="34" charset="0"/>
+              <a:cs typeface="Arial" panose="020B0604020202020204" pitchFamily="34" charset="0"/>
             </a:endParaRPr>
           </a:p>
         </p:txBody>
@@ -7194,7 +7284,8 @@
                 <a:solidFill>
                   <a:schemeClr val="bg1"/>
                 </a:solidFill>
-                <a:latin typeface="Ubuntu" panose="020B0504030602030204" pitchFamily="34" charset="0"/>
+                <a:latin typeface="Arial" panose="020B0604020202020204" pitchFamily="34" charset="0"/>
+                <a:cs typeface="Arial" panose="020B0604020202020204" pitchFamily="34" charset="0"/>
               </a:rPr>
               <a:t>Serif (</a:t>
             </a:r>
@@ -7203,7 +7294,8 @@
                 <a:solidFill>
                   <a:schemeClr val="bg1"/>
                 </a:solidFill>
-                <a:latin typeface="Ubuntu" panose="020B0504030602030204" pitchFamily="34" charset="0"/>
+                <a:latin typeface="Arial" panose="020B0604020202020204" pitchFamily="34" charset="0"/>
+                <a:cs typeface="Arial" panose="020B0604020202020204" pitchFamily="34" charset="0"/>
               </a:rPr>
               <a:t>Serifa</a:t>
             </a:r>
@@ -7212,7 +7304,8 @@
                 <a:solidFill>
                   <a:schemeClr val="bg1"/>
                 </a:solidFill>
-                <a:latin typeface="Ubuntu" panose="020B0504030602030204" pitchFamily="34" charset="0"/>
+                <a:latin typeface="Arial" panose="020B0604020202020204" pitchFamily="34" charset="0"/>
+                <a:cs typeface="Arial" panose="020B0604020202020204" pitchFamily="34" charset="0"/>
               </a:rPr>
               <a:t>) o Romanas</a:t>
             </a:r>
@@ -7221,7 +7314,8 @@
                 <a:solidFill>
                   <a:schemeClr val="bg1"/>
                 </a:solidFill>
-                <a:latin typeface="Ubuntu" panose="020B0504030602030204" pitchFamily="34" charset="0"/>
+                <a:latin typeface="Arial" panose="020B0604020202020204" pitchFamily="34" charset="0"/>
+                <a:cs typeface="Arial" panose="020B0604020202020204" pitchFamily="34" charset="0"/>
               </a:rPr>
               <a:t>: tienen adornos o remates. Para párrafos largos. Transmiten formalidad</a:t>
             </a:r>
@@ -7229,7 +7323,8 @@
               <a:solidFill>
                 <a:schemeClr val="bg1"/>
               </a:solidFill>
-              <a:latin typeface="Ubuntu" panose="020B0504030602030204" pitchFamily="34" charset="0"/>
+              <a:latin typeface="Arial" panose="020B0604020202020204" pitchFamily="34" charset="0"/>
+              <a:cs typeface="Arial" panose="020B0604020202020204" pitchFamily="34" charset="0"/>
             </a:endParaRPr>
           </a:p>
         </p:txBody>
@@ -7261,7 +7356,8 @@
                 <a:solidFill>
                   <a:schemeClr val="bg1"/>
                 </a:solidFill>
-                <a:latin typeface="Ubuntu" panose="020B0504030602030204" pitchFamily="34" charset="0"/>
+                <a:latin typeface="Arial" panose="020B0604020202020204" pitchFamily="34" charset="0"/>
+                <a:cs typeface="Arial" panose="020B0604020202020204" pitchFamily="34" charset="0"/>
               </a:rPr>
               <a:t>Sans Serif (Sin </a:t>
             </a:r>
@@ -7270,7 +7366,8 @@
                 <a:solidFill>
                   <a:schemeClr val="bg1"/>
                 </a:solidFill>
-                <a:latin typeface="Ubuntu" panose="020B0504030602030204" pitchFamily="34" charset="0"/>
+                <a:latin typeface="Arial" panose="020B0604020202020204" pitchFamily="34" charset="0"/>
+                <a:cs typeface="Arial" panose="020B0604020202020204" pitchFamily="34" charset="0"/>
               </a:rPr>
               <a:t>Serifa</a:t>
             </a:r>
@@ -7279,7 +7376,8 @@
                 <a:solidFill>
                   <a:schemeClr val="bg1"/>
                 </a:solidFill>
-                <a:latin typeface="Ubuntu" panose="020B0504030602030204" pitchFamily="34" charset="0"/>
+                <a:latin typeface="Arial" panose="020B0604020202020204" pitchFamily="34" charset="0"/>
+                <a:cs typeface="Arial" panose="020B0604020202020204" pitchFamily="34" charset="0"/>
               </a:rPr>
               <a:t>) o Palo Seco</a:t>
             </a:r>
@@ -7288,7 +7386,8 @@
                 <a:solidFill>
                   <a:schemeClr val="bg1"/>
                 </a:solidFill>
-                <a:latin typeface="Ubuntu" panose="020B0504030602030204" pitchFamily="34" charset="0"/>
+                <a:latin typeface="Arial" panose="020B0604020202020204" pitchFamily="34" charset="0"/>
+                <a:cs typeface="Arial" panose="020B0604020202020204" pitchFamily="34" charset="0"/>
               </a:rPr>
               <a:t>: No tienen adornos. Textos cortos o titulares para no hacer complicada la lectura. Transmite modernidad</a:t>
             </a:r>
@@ -7296,7 +7395,8 @@
               <a:solidFill>
                 <a:schemeClr val="bg1"/>
               </a:solidFill>
-              <a:latin typeface="Ubuntu" panose="020B0504030602030204" pitchFamily="34" charset="0"/>
+              <a:latin typeface="Arial" panose="020B0604020202020204" pitchFamily="34" charset="0"/>
+              <a:cs typeface="Arial" panose="020B0604020202020204" pitchFamily="34" charset="0"/>
             </a:endParaRPr>
           </a:p>
         </p:txBody>
@@ -7310,7 +7410,7 @@
         <p:spPr>
           <a:xfrm>
             <a:off x="539553" y="4255129"/>
-            <a:ext cx="4320479" cy="400110"/>
+            <a:ext cx="4320479" cy="707886"/>
           </a:xfrm>
           <a:prstGeom prst="rect">
             <a:avLst/>
@@ -7328,7 +7428,8 @@
                 <a:solidFill>
                   <a:schemeClr val="bg1"/>
                 </a:solidFill>
-                <a:latin typeface="Ubuntu" panose="020B0504030602030204" pitchFamily="34" charset="0"/>
+                <a:latin typeface="Arial" panose="020B0604020202020204" pitchFamily="34" charset="0"/>
+                <a:cs typeface="Arial" panose="020B0604020202020204" pitchFamily="34" charset="0"/>
               </a:rPr>
               <a:t>Script o Cursiva</a:t>
             </a:r>
@@ -7337,7 +7438,8 @@
                 <a:solidFill>
                   <a:schemeClr val="bg1"/>
                 </a:solidFill>
-                <a:latin typeface="Ubuntu" panose="020B0504030602030204" pitchFamily="34" charset="0"/>
+                <a:latin typeface="Arial" panose="020B0604020202020204" pitchFamily="34" charset="0"/>
+                <a:cs typeface="Arial" panose="020B0604020202020204" pitchFamily="34" charset="0"/>
               </a:rPr>
               <a:t>: Para firmas o citas</a:t>
             </a:r>
@@ -7345,7 +7447,8 @@
               <a:solidFill>
                 <a:schemeClr val="bg1"/>
               </a:solidFill>
-              <a:latin typeface="Ubuntu" panose="020B0504030602030204" pitchFamily="34" charset="0"/>
+              <a:latin typeface="Arial" panose="020B0604020202020204" pitchFamily="34" charset="0"/>
+              <a:cs typeface="Arial" panose="020B0604020202020204" pitchFamily="34" charset="0"/>
             </a:endParaRPr>
           </a:p>
         </p:txBody>
@@ -7377,7 +7480,8 @@
                 <a:solidFill>
                   <a:schemeClr val="bg1"/>
                 </a:solidFill>
-                <a:latin typeface="Ubuntu" panose="020B0504030602030204" pitchFamily="34" charset="0"/>
+                <a:latin typeface="Arial" panose="020B0604020202020204" pitchFamily="34" charset="0"/>
+                <a:cs typeface="Arial" panose="020B0604020202020204" pitchFamily="34" charset="0"/>
               </a:rPr>
               <a:t>Decorativa o de Fantasía</a:t>
             </a:r>
@@ -7386,7 +7490,8 @@
                 <a:solidFill>
                   <a:schemeClr val="bg1"/>
                 </a:solidFill>
-                <a:latin typeface="Ubuntu" panose="020B0504030602030204" pitchFamily="34" charset="0"/>
+                <a:latin typeface="Arial" panose="020B0604020202020204" pitchFamily="34" charset="0"/>
+                <a:cs typeface="Arial" panose="020B0604020202020204" pitchFamily="34" charset="0"/>
               </a:rPr>
               <a:t>: no están hechas para ser legibles. Titulares cortos o solo para resaltar</a:t>
             </a:r>
@@ -7394,7 +7499,8 @@
               <a:solidFill>
                 <a:schemeClr val="bg1"/>
               </a:solidFill>
-              <a:latin typeface="Ubuntu" panose="020B0504030602030204" pitchFamily="34" charset="0"/>
+              <a:latin typeface="Arial" panose="020B0604020202020204" pitchFamily="34" charset="0"/>
+              <a:cs typeface="Arial" panose="020B0604020202020204" pitchFamily="34" charset="0"/>
             </a:endParaRPr>
           </a:p>
         </p:txBody>
@@ -7588,6 +7694,60 @@
           <a:xfrm>
             <a:off x="6586680" y="347172"/>
             <a:ext cx="1729736" cy="6091142"/>
+          </a:xfrm>
+          <a:prstGeom prst="rect">
+            <a:avLst/>
+          </a:prstGeom>
+          <a:noFill/>
+          <a:ln>
+            <a:noFill/>
+          </a:ln>
+          <a:extLst>
+            <a:ext uri="{909E8E84-426E-40DD-AFC4-6F175D3DCCD1}">
+              <a14:hiddenFill xmlns:a14="http://schemas.microsoft.com/office/drawing/2010/main">
+                <a:solidFill>
+                  <a:schemeClr val="accent1"/>
+                </a:solidFill>
+              </a14:hiddenFill>
+            </a:ext>
+            <a:ext uri="{91240B29-F687-4F45-9708-019B960494DF}">
+              <a14:hiddenLine xmlns:a14="http://schemas.microsoft.com/office/drawing/2010/main" w="9525">
+                <a:solidFill>
+                  <a:schemeClr val="tx1"/>
+                </a:solidFill>
+                <a:miter lim="800000"/>
+                <a:headEnd/>
+                <a:tailEnd/>
+              </a14:hiddenLine>
+            </a:ext>
+          </a:extLst>
+        </p:spPr>
+      </p:pic>
+      <p:pic>
+        <p:nvPicPr>
+          <p:cNvPr id="2" name="Picture 2"/>
+          <p:cNvPicPr>
+            <a:picLocks noChangeAspect="1" noChangeArrowheads="1"/>
+          </p:cNvPicPr>
+          <p:nvPr/>
+        </p:nvPicPr>
+        <p:blipFill>
+          <a:blip r:embed="rId3">
+            <a:extLst>
+              <a:ext uri="{28A0092B-C50C-407E-A947-70E740481C1C}">
+                <a14:useLocalDpi xmlns:a14="http://schemas.microsoft.com/office/drawing/2010/main" val="0"/>
+              </a:ext>
+            </a:extLst>
+          </a:blip>
+          <a:srcRect/>
+          <a:stretch>
+            <a:fillRect/>
+          </a:stretch>
+        </p:blipFill>
+        <p:spPr bwMode="auto">
+          <a:xfrm>
+            <a:off x="6329581" y="450498"/>
+            <a:ext cx="1847697" cy="5956392"/>
           </a:xfrm>
           <a:prstGeom prst="rect">
             <a:avLst/>
@@ -7683,7 +7843,7 @@
         <p:spPr>
           <a:xfrm>
             <a:off x="338741" y="199673"/>
-            <a:ext cx="2669320" cy="553998"/>
+            <a:ext cx="2576346" cy="496996"/>
           </a:xfrm>
           <a:prstGeom prst="rect">
             <a:avLst/>
@@ -7706,7 +7866,8 @@
                 <a:solidFill>
                   <a:schemeClr val="bg1"/>
                 </a:solidFill>
-                <a:latin typeface="Ubuntu" panose="020B0504030602030204" pitchFamily="34" charset="0"/>
+                <a:latin typeface="Arial" panose="020B0604020202020204" pitchFamily="34" charset="0"/>
+                <a:cs typeface="Arial" panose="020B0604020202020204" pitchFamily="34" charset="0"/>
               </a:rPr>
               <a:t>Debe tener contraste</a:t>
             </a:r>
@@ -7763,7 +7924,7 @@
         <p:spPr>
           <a:xfrm>
             <a:off x="368085" y="3586617"/>
-            <a:ext cx="4344459" cy="490455"/>
+            <a:ext cx="4272452" cy="496996"/>
           </a:xfrm>
           <a:prstGeom prst="rect">
             <a:avLst/>
@@ -7786,7 +7947,8 @@
                 <a:solidFill>
                   <a:schemeClr val="bg1"/>
                 </a:solidFill>
-                <a:latin typeface="Ubuntu" panose="020B0504030602030204" pitchFamily="34" charset="0"/>
+                <a:latin typeface="Arial" panose="020B0604020202020204" pitchFamily="34" charset="0"/>
+                <a:cs typeface="Arial" panose="020B0604020202020204" pitchFamily="34" charset="0"/>
               </a:rPr>
               <a:t>Tres fuentes van a competir entre sí</a:t>
             </a:r>
@@ -7898,7 +8060,7 @@
         <p:spPr>
           <a:xfrm>
             <a:off x="323528" y="476672"/>
-            <a:ext cx="5497018" cy="553998"/>
+            <a:ext cx="5482591" cy="496996"/>
           </a:xfrm>
           <a:prstGeom prst="rect">
             <a:avLst/>
@@ -7921,7 +8083,8 @@
                 <a:solidFill>
                   <a:schemeClr val="bg1"/>
                 </a:solidFill>
-                <a:latin typeface="Ubuntu" panose="020B0504030602030204" pitchFamily="34" charset="0"/>
+                <a:latin typeface="Arial" panose="020B0604020202020204" pitchFamily="34" charset="0"/>
+                <a:cs typeface="Arial" panose="020B0604020202020204" pitchFamily="34" charset="0"/>
               </a:rPr>
               <a:t>Los tamaños y grosores nos sirven para dividir</a:t>
             </a:r>
@@ -7937,7 +8100,7 @@
         <p:spPr>
           <a:xfrm>
             <a:off x="323528" y="3717032"/>
-            <a:ext cx="6801862" cy="490455"/>
+            <a:ext cx="6813084" cy="496996"/>
           </a:xfrm>
           <a:prstGeom prst="rect">
             <a:avLst/>
@@ -7960,7 +8123,8 @@
                 <a:solidFill>
                   <a:schemeClr val="bg1"/>
                 </a:solidFill>
-                <a:latin typeface="Ubuntu" panose="020B0504030602030204" pitchFamily="34" charset="0"/>
+                <a:latin typeface="Arial" panose="020B0604020202020204" pitchFamily="34" charset="0"/>
+                <a:cs typeface="Arial" panose="020B0604020202020204" pitchFamily="34" charset="0"/>
               </a:rPr>
               <a:t>Si necesitamos que algo se lea, no sacrificar la legibilidad </a:t>
             </a:r>
@@ -8111,7 +8275,7 @@
         <p:spPr>
           <a:xfrm>
             <a:off x="323528" y="1144600"/>
-            <a:ext cx="3515706" cy="490455"/>
+            <a:ext cx="3402342" cy="496996"/>
           </a:xfrm>
           <a:prstGeom prst="rect">
             <a:avLst/>
@@ -8134,7 +8298,8 @@
                 <a:solidFill>
                   <a:schemeClr val="bg1"/>
                 </a:solidFill>
-                <a:latin typeface="Ubuntu" panose="020B0504030602030204" pitchFamily="34" charset="0"/>
+                <a:latin typeface="Arial" panose="020B0604020202020204" pitchFamily="34" charset="0"/>
+                <a:cs typeface="Arial" panose="020B0604020202020204" pitchFamily="34" charset="0"/>
               </a:rPr>
               <a:t>Tomar en cuenta el contexto</a:t>
             </a:r>
@@ -8142,7 +8307,8 @@
               <a:solidFill>
                 <a:schemeClr val="bg1"/>
               </a:solidFill>
-              <a:latin typeface="Ubuntu" panose="020B0504030602030204" pitchFamily="34" charset="0"/>
+              <a:latin typeface="Arial" panose="020B0604020202020204" pitchFamily="34" charset="0"/>
+              <a:cs typeface="Arial" panose="020B0604020202020204" pitchFamily="34" charset="0"/>
             </a:endParaRPr>
           </a:p>
         </p:txBody>
@@ -8272,7 +8438,8 @@
                 <a:solidFill>
                   <a:schemeClr val="bg1"/>
                 </a:solidFill>
-                <a:latin typeface="Ubuntu" panose="020B0504030602030204" pitchFamily="34" charset="0"/>
+                <a:latin typeface="Arial" panose="020B0604020202020204" pitchFamily="34" charset="0"/>
+                <a:cs typeface="Arial" panose="020B0604020202020204" pitchFamily="34" charset="0"/>
               </a:rPr>
               <a:t>Etapas de desarrollo de Software</a:t>
             </a:r>
@@ -8280,7 +8447,8 @@
               <a:solidFill>
                 <a:schemeClr val="bg1"/>
               </a:solidFill>
-              <a:latin typeface="Ubuntu" panose="020B0504030602030204" pitchFamily="34" charset="0"/>
+              <a:latin typeface="Arial" panose="020B0604020202020204" pitchFamily="34" charset="0"/>
+              <a:cs typeface="Arial" panose="020B0604020202020204" pitchFamily="34" charset="0"/>
             </a:endParaRPr>
           </a:p>
         </p:txBody>
@@ -8527,7 +8695,8 @@
                 <a:solidFill>
                   <a:schemeClr val="bg1"/>
                 </a:solidFill>
-                <a:latin typeface="Ubuntu" panose="020B0504030602030204" pitchFamily="34" charset="0"/>
+                <a:latin typeface="Arial" panose="020B0604020202020204" pitchFamily="34" charset="0"/>
+                <a:cs typeface="Arial" panose="020B0604020202020204" pitchFamily="34" charset="0"/>
               </a:rPr>
               <a:t>Editor de código:</a:t>
             </a:r>
@@ -8538,7 +8707,8 @@
                 <a:solidFill>
                   <a:schemeClr val="bg1"/>
                 </a:solidFill>
-                <a:latin typeface="Ubuntu" panose="020B0504030602030204" pitchFamily="34" charset="0"/>
+                <a:latin typeface="Arial" panose="020B0604020202020204" pitchFamily="34" charset="0"/>
+                <a:cs typeface="Arial" panose="020B0604020202020204" pitchFamily="34" charset="0"/>
               </a:rPr>
               <a:t>Visual Studio </a:t>
             </a:r>
@@ -8547,7 +8717,8 @@
                 <a:solidFill>
                   <a:schemeClr val="bg1"/>
                 </a:solidFill>
-                <a:latin typeface="Ubuntu" panose="020B0504030602030204" pitchFamily="34" charset="0"/>
+                <a:latin typeface="Arial" panose="020B0604020202020204" pitchFamily="34" charset="0"/>
+                <a:cs typeface="Arial" panose="020B0604020202020204" pitchFamily="34" charset="0"/>
               </a:rPr>
               <a:t>Code</a:t>
             </a:r>
@@ -8555,7 +8726,8 @@
               <a:solidFill>
                 <a:schemeClr val="bg1"/>
               </a:solidFill>
-              <a:latin typeface="Ubuntu" panose="020B0504030602030204" pitchFamily="34" charset="0"/>
+              <a:latin typeface="Arial" panose="020B0604020202020204" pitchFamily="34" charset="0"/>
+              <a:cs typeface="Arial" panose="020B0604020202020204" pitchFamily="34" charset="0"/>
             </a:endParaRPr>
           </a:p>
         </p:txBody>
@@ -8587,7 +8759,8 @@
                 <a:solidFill>
                   <a:schemeClr val="bg1"/>
                 </a:solidFill>
-                <a:latin typeface="Ubuntu" panose="020B0504030602030204" pitchFamily="34" charset="0"/>
+                <a:latin typeface="Arial" panose="020B0604020202020204" pitchFamily="34" charset="0"/>
+                <a:cs typeface="Arial" panose="020B0604020202020204" pitchFamily="34" charset="0"/>
               </a:rPr>
               <a:t>Sistema de control de versiones:</a:t>
             </a:r>
@@ -8598,7 +8771,8 @@
                 <a:solidFill>
                   <a:schemeClr val="bg1"/>
                 </a:solidFill>
-                <a:latin typeface="Ubuntu" panose="020B0504030602030204" pitchFamily="34" charset="0"/>
+                <a:latin typeface="Arial" panose="020B0604020202020204" pitchFamily="34" charset="0"/>
+                <a:cs typeface="Arial" panose="020B0604020202020204" pitchFamily="34" charset="0"/>
               </a:rPr>
               <a:t>GIT</a:t>
             </a:r>
@@ -8606,7 +8780,8 @@
               <a:solidFill>
                 <a:schemeClr val="bg1"/>
               </a:solidFill>
-              <a:latin typeface="Ubuntu" panose="020B0504030602030204" pitchFamily="34" charset="0"/>
+              <a:latin typeface="Arial" panose="020B0604020202020204" pitchFamily="34" charset="0"/>
+              <a:cs typeface="Arial" panose="020B0604020202020204" pitchFamily="34" charset="0"/>
             </a:endParaRPr>
           </a:p>
         </p:txBody>
@@ -8638,7 +8813,8 @@
                 <a:solidFill>
                   <a:schemeClr val="bg1"/>
                 </a:solidFill>
-                <a:latin typeface="Ubuntu" panose="020B0504030602030204" pitchFamily="34" charset="0"/>
+                <a:latin typeface="Arial" panose="020B0604020202020204" pitchFamily="34" charset="0"/>
+                <a:cs typeface="Arial" panose="020B0604020202020204" pitchFamily="34" charset="0"/>
               </a:rPr>
               <a:t>Diseño de página:</a:t>
             </a:r>
@@ -8649,7 +8825,8 @@
                 <a:solidFill>
                   <a:schemeClr val="bg1"/>
                 </a:solidFill>
-                <a:latin typeface="Ubuntu" panose="020B0504030602030204" pitchFamily="34" charset="0"/>
+                <a:latin typeface="Arial" panose="020B0604020202020204" pitchFamily="34" charset="0"/>
+                <a:cs typeface="Arial" panose="020B0604020202020204" pitchFamily="34" charset="0"/>
               </a:rPr>
               <a:t>Figma</a:t>
             </a:r>
@@ -8657,7 +8834,8 @@
               <a:solidFill>
                 <a:schemeClr val="bg1"/>
               </a:solidFill>
-              <a:latin typeface="Ubuntu" panose="020B0504030602030204" pitchFamily="34" charset="0"/>
+              <a:latin typeface="Arial" panose="020B0604020202020204" pitchFamily="34" charset="0"/>
+              <a:cs typeface="Arial" panose="020B0604020202020204" pitchFamily="34" charset="0"/>
             </a:endParaRPr>
           </a:p>
         </p:txBody>
@@ -8689,7 +8867,8 @@
                 <a:solidFill>
                   <a:schemeClr val="bg1"/>
                 </a:solidFill>
-                <a:latin typeface="Ubuntu" panose="020B0504030602030204" pitchFamily="34" charset="0"/>
+                <a:latin typeface="Arial" panose="020B0604020202020204" pitchFamily="34" charset="0"/>
+                <a:cs typeface="Arial" panose="020B0604020202020204" pitchFamily="34" charset="0"/>
               </a:rPr>
               <a:t>Administrador de Paquetes:</a:t>
             </a:r>
@@ -8700,7 +8879,8 @@
                 <a:solidFill>
                   <a:schemeClr val="bg1"/>
                 </a:solidFill>
-                <a:latin typeface="Ubuntu" panose="020B0504030602030204" pitchFamily="34" charset="0"/>
+                <a:latin typeface="Arial" panose="020B0604020202020204" pitchFamily="34" charset="0"/>
+                <a:cs typeface="Arial" panose="020B0604020202020204" pitchFamily="34" charset="0"/>
               </a:rPr>
               <a:t>NPM</a:t>
             </a:r>
@@ -8708,7 +8888,8 @@
               <a:solidFill>
                 <a:schemeClr val="bg1"/>
               </a:solidFill>
-              <a:latin typeface="Ubuntu" panose="020B0504030602030204" pitchFamily="34" charset="0"/>
+              <a:latin typeface="Arial" panose="020B0604020202020204" pitchFamily="34" charset="0"/>
+              <a:cs typeface="Arial" panose="020B0604020202020204" pitchFamily="34" charset="0"/>
             </a:endParaRPr>
           </a:p>
         </p:txBody>
@@ -8779,7 +8960,7 @@
         <p:spPr>
           <a:xfrm>
             <a:off x="663151" y="908720"/>
-            <a:ext cx="2807179" cy="523220"/>
+            <a:ext cx="2980303" cy="523220"/>
           </a:xfrm>
           <a:prstGeom prst="rect">
             <a:avLst/>
@@ -8797,7 +8978,8 @@
                 <a:solidFill>
                   <a:schemeClr val="bg1"/>
                 </a:solidFill>
-                <a:latin typeface="Ubuntu" panose="020B0504030602030204" pitchFamily="34" charset="0"/>
+                <a:latin typeface="Arial" panose="020B0604020202020204" pitchFamily="34" charset="0"/>
+                <a:cs typeface="Arial" panose="020B0604020202020204" pitchFamily="34" charset="0"/>
               </a:rPr>
               <a:t>¿Qué es Figma?</a:t>
             </a:r>
@@ -8805,7 +8987,8 @@
               <a:solidFill>
                 <a:schemeClr val="bg1"/>
               </a:solidFill>
-              <a:latin typeface="Ubuntu" panose="020B0504030602030204" pitchFamily="34" charset="0"/>
+              <a:latin typeface="Arial" panose="020B0604020202020204" pitchFamily="34" charset="0"/>
+              <a:cs typeface="Arial" panose="020B0604020202020204" pitchFamily="34" charset="0"/>
             </a:endParaRPr>
           </a:p>
         </p:txBody>
@@ -8849,7 +9032,7 @@
         <p:spPr>
           <a:xfrm>
             <a:off x="655536" y="1566332"/>
-            <a:ext cx="5191341" cy="1754326"/>
+            <a:ext cx="5191341" cy="1477328"/>
           </a:xfrm>
           <a:prstGeom prst="rect">
             <a:avLst/>
@@ -8867,7 +9050,8 @@
                 <a:solidFill>
                   <a:schemeClr val="bg1"/>
                 </a:solidFill>
-                <a:latin typeface="Ubuntu" panose="020B0504030602030204" pitchFamily="34" charset="0"/>
+                <a:latin typeface="Arial" panose="020B0604020202020204" pitchFamily="34" charset="0"/>
+                <a:cs typeface="Arial" panose="020B0604020202020204" pitchFamily="34" charset="0"/>
               </a:rPr>
               <a:t>Figma es un editor de gráficos vectorial y una herramienta de generación de prototipos, principalmente basada en la web, con características off-line adicionales habilitadas por aplicaciones de escritorio en </a:t>
             </a:r>
@@ -8876,7 +9060,8 @@
                 <a:solidFill>
                   <a:schemeClr val="bg1"/>
                 </a:solidFill>
-                <a:latin typeface="Ubuntu" panose="020B0504030602030204" pitchFamily="34" charset="0"/>
+                <a:latin typeface="Arial" panose="020B0604020202020204" pitchFamily="34" charset="0"/>
+                <a:cs typeface="Arial" panose="020B0604020202020204" pitchFamily="34" charset="0"/>
               </a:rPr>
               <a:t>macOS</a:t>
             </a:r>
@@ -8885,7 +9070,8 @@
                 <a:solidFill>
                   <a:schemeClr val="bg1"/>
                 </a:solidFill>
-                <a:latin typeface="Ubuntu" panose="020B0504030602030204" pitchFamily="34" charset="0"/>
+                <a:latin typeface="Arial" panose="020B0604020202020204" pitchFamily="34" charset="0"/>
+                <a:cs typeface="Arial" panose="020B0604020202020204" pitchFamily="34" charset="0"/>
               </a:rPr>
               <a:t> y Windows.</a:t>
             </a:r>
@@ -8893,7 +9079,8 @@
               <a:solidFill>
                 <a:schemeClr val="bg1"/>
               </a:solidFill>
-              <a:latin typeface="Ubuntu" panose="020B0504030602030204" pitchFamily="34" charset="0"/>
+              <a:latin typeface="Arial" panose="020B0604020202020204" pitchFamily="34" charset="0"/>
+              <a:cs typeface="Arial" panose="020B0604020202020204" pitchFamily="34" charset="0"/>
             </a:endParaRPr>
           </a:p>
         </p:txBody>
@@ -9003,7 +9190,7 @@
         <p:spPr>
           <a:xfrm>
             <a:off x="673490" y="764704"/>
-            <a:ext cx="3155031" cy="523220"/>
+            <a:ext cx="3220753" cy="523220"/>
           </a:xfrm>
           <a:prstGeom prst="rect">
             <a:avLst/>
@@ -9021,7 +9208,8 @@
                 <a:solidFill>
                   <a:schemeClr val="bg1"/>
                 </a:solidFill>
-                <a:latin typeface="Ubuntu" panose="020B0504030602030204" pitchFamily="34" charset="0"/>
+                <a:latin typeface="Arial" panose="020B0604020202020204" pitchFamily="34" charset="0"/>
+                <a:cs typeface="Arial" panose="020B0604020202020204" pitchFamily="34" charset="0"/>
               </a:rPr>
               <a:t>Dashboard Figma</a:t>
             </a:r>
@@ -9029,7 +9217,8 @@
               <a:solidFill>
                 <a:schemeClr val="bg1"/>
               </a:solidFill>
-              <a:latin typeface="Ubuntu" panose="020B0504030602030204" pitchFamily="34" charset="0"/>
+              <a:latin typeface="Arial" panose="020B0604020202020204" pitchFamily="34" charset="0"/>
+              <a:cs typeface="Arial" panose="020B0604020202020204" pitchFamily="34" charset="0"/>
             </a:endParaRPr>
           </a:p>
         </p:txBody>
@@ -9061,7 +9250,8 @@
                 <a:solidFill>
                   <a:schemeClr val="bg1"/>
                 </a:solidFill>
-                <a:latin typeface="Ubuntu" panose="020B0504030602030204" pitchFamily="34" charset="0"/>
+                <a:latin typeface="Arial" panose="020B0604020202020204" pitchFamily="34" charset="0"/>
+                <a:cs typeface="Arial" panose="020B0604020202020204" pitchFamily="34" charset="0"/>
               </a:rPr>
               <a:t>Nuevo Documento o importar Documento</a:t>
             </a:r>
@@ -9069,7 +9259,8 @@
               <a:solidFill>
                 <a:schemeClr val="bg1"/>
               </a:solidFill>
-              <a:latin typeface="Ubuntu" panose="020B0504030602030204" pitchFamily="34" charset="0"/>
+              <a:latin typeface="Arial" panose="020B0604020202020204" pitchFamily="34" charset="0"/>
+              <a:cs typeface="Arial" panose="020B0604020202020204" pitchFamily="34" charset="0"/>
             </a:endParaRPr>
           </a:p>
         </p:txBody>
@@ -9101,7 +9292,8 @@
                 <a:solidFill>
                   <a:schemeClr val="bg1"/>
                 </a:solidFill>
-                <a:latin typeface="Ubuntu" panose="020B0504030602030204" pitchFamily="34" charset="0"/>
+                <a:latin typeface="Arial" panose="020B0604020202020204" pitchFamily="34" charset="0"/>
+                <a:cs typeface="Arial" panose="020B0604020202020204" pitchFamily="34" charset="0"/>
               </a:rPr>
               <a:t>Equipos de Trabajo</a:t>
             </a:r>
@@ -9109,7 +9301,8 @@
               <a:solidFill>
                 <a:schemeClr val="bg1"/>
               </a:solidFill>
-              <a:latin typeface="Ubuntu" panose="020B0504030602030204" pitchFamily="34" charset="0"/>
+              <a:latin typeface="Arial" panose="020B0604020202020204" pitchFamily="34" charset="0"/>
+              <a:cs typeface="Arial" panose="020B0604020202020204" pitchFamily="34" charset="0"/>
             </a:endParaRPr>
           </a:p>
         </p:txBody>
@@ -9141,7 +9334,8 @@
                 <a:solidFill>
                   <a:schemeClr val="bg1"/>
                 </a:solidFill>
-                <a:latin typeface="Ubuntu" panose="020B0504030602030204" pitchFamily="34" charset="0"/>
+                <a:latin typeface="Arial" panose="020B0604020202020204" pitchFamily="34" charset="0"/>
+                <a:cs typeface="Arial" panose="020B0604020202020204" pitchFamily="34" charset="0"/>
               </a:rPr>
               <a:t>Proyectos</a:t>
             </a:r>
@@ -9149,7 +9343,8 @@
               <a:solidFill>
                 <a:schemeClr val="bg1"/>
               </a:solidFill>
-              <a:latin typeface="Ubuntu" panose="020B0504030602030204" pitchFamily="34" charset="0"/>
+              <a:latin typeface="Arial" panose="020B0604020202020204" pitchFamily="34" charset="0"/>
+              <a:cs typeface="Arial" panose="020B0604020202020204" pitchFamily="34" charset="0"/>
             </a:endParaRPr>
           </a:p>
         </p:txBody>
@@ -9381,8 +9576,8 @@
         </p:nvSpPr>
         <p:spPr>
           <a:xfrm>
-            <a:off x="1292310" y="2028617"/>
-            <a:ext cx="6559381" cy="2800767"/>
+            <a:off x="1258898" y="1412776"/>
+            <a:ext cx="6559381" cy="4154984"/>
           </a:xfrm>
           <a:prstGeom prst="rect">
             <a:avLst/>
@@ -9401,7 +9596,8 @@
                 <a:solidFill>
                   <a:schemeClr val="bg1"/>
                 </a:solidFill>
-                <a:latin typeface="Futurama" pitchFamily="2" charset="0"/>
+                <a:latin typeface="Arial" panose="020B0604020202020204" pitchFamily="34" charset="0"/>
+                <a:cs typeface="Arial" panose="020B0604020202020204" pitchFamily="34" charset="0"/>
               </a:rPr>
               <a:t>Diseño de una página Web</a:t>
             </a:r>
@@ -9409,7 +9605,8 @@
               <a:solidFill>
                 <a:schemeClr val="bg1"/>
               </a:solidFill>
-              <a:latin typeface="Futurama" pitchFamily="2" charset="0"/>
+              <a:latin typeface="Arial" panose="020B0604020202020204" pitchFamily="34" charset="0"/>
+              <a:cs typeface="Arial" panose="020B0604020202020204" pitchFamily="34" charset="0"/>
             </a:endParaRPr>
           </a:p>
         </p:txBody>
@@ -9479,8 +9676,8 @@
         </p:nvSpPr>
         <p:spPr>
           <a:xfrm>
-            <a:off x="570517" y="1351508"/>
-            <a:ext cx="8002966" cy="4154984"/>
+            <a:off x="537601" y="548680"/>
+            <a:ext cx="8002966" cy="5509200"/>
           </a:xfrm>
           <a:prstGeom prst="rect">
             <a:avLst/>
@@ -9499,7 +9696,8 @@
                 <a:solidFill>
                   <a:schemeClr val="bg1"/>
                 </a:solidFill>
-                <a:latin typeface="Futurama" pitchFamily="2" charset="0"/>
+                <a:latin typeface="Arial" panose="020B0604020202020204" pitchFamily="34" charset="0"/>
+                <a:cs typeface="Arial" panose="020B0604020202020204" pitchFamily="34" charset="0"/>
               </a:rPr>
               <a:t>Elección de Tipografía y Paleta de Colores</a:t>
             </a:r>
@@ -9507,7 +9705,8 @@
               <a:solidFill>
                 <a:schemeClr val="bg1"/>
               </a:solidFill>
-              <a:latin typeface="Futurama" pitchFamily="2" charset="0"/>
+              <a:latin typeface="Arial" panose="020B0604020202020204" pitchFamily="34" charset="0"/>
+              <a:cs typeface="Arial" panose="020B0604020202020204" pitchFamily="34" charset="0"/>
             </a:endParaRPr>
           </a:p>
         </p:txBody>
@@ -9596,7 +9795,8 @@
                 <a:solidFill>
                   <a:schemeClr val="bg1"/>
                 </a:solidFill>
-                <a:latin typeface="Ubuntu" panose="020B0504030602030204" pitchFamily="34" charset="0"/>
+                <a:latin typeface="Arial" panose="020B0604020202020204" pitchFamily="34" charset="0"/>
+                <a:cs typeface="Arial" panose="020B0604020202020204" pitchFamily="34" charset="0"/>
               </a:rPr>
               <a:t>Paleta de colores</a:t>
             </a:r>
@@ -9604,7 +9804,8 @@
               <a:solidFill>
                 <a:schemeClr val="bg1"/>
               </a:solidFill>
-              <a:latin typeface="Ubuntu" panose="020B0504030602030204" pitchFamily="34" charset="0"/>
+              <a:latin typeface="Arial" panose="020B0604020202020204" pitchFamily="34" charset="0"/>
+              <a:cs typeface="Arial" panose="020B0604020202020204" pitchFamily="34" charset="0"/>
             </a:endParaRPr>
           </a:p>
         </p:txBody>
@@ -9718,7 +9919,8 @@
                 <a:solidFill>
                   <a:schemeClr val="bg1"/>
                 </a:solidFill>
-                <a:latin typeface="Ubuntu" panose="020B0504030602030204" pitchFamily="34" charset="0"/>
+                <a:latin typeface="Arial" panose="020B0604020202020204" pitchFamily="34" charset="0"/>
+                <a:cs typeface="Arial" panose="020B0604020202020204" pitchFamily="34" charset="0"/>
               </a:rPr>
               <a:t>Los colores chillones envejecen nuestra web</a:t>
             </a:r>
@@ -9726,7 +9928,8 @@
               <a:solidFill>
                 <a:schemeClr val="bg1"/>
               </a:solidFill>
-              <a:latin typeface="Ubuntu" panose="020B0504030602030204" pitchFamily="34" charset="0"/>
+              <a:latin typeface="Arial" panose="020B0604020202020204" pitchFamily="34" charset="0"/>
+              <a:cs typeface="Arial" panose="020B0604020202020204" pitchFamily="34" charset="0"/>
             </a:endParaRPr>
           </a:p>
         </p:txBody>
@@ -9758,7 +9961,8 @@
                 <a:solidFill>
                   <a:schemeClr val="bg1"/>
                 </a:solidFill>
-                <a:latin typeface="Ubuntu" panose="020B0504030602030204" pitchFamily="34" charset="0"/>
+                <a:latin typeface="Arial" panose="020B0604020202020204" pitchFamily="34" charset="0"/>
+                <a:cs typeface="Arial" panose="020B0604020202020204" pitchFamily="34" charset="0"/>
               </a:rPr>
               <a:t>Utilizar paletas de colores  modernos.</a:t>
             </a:r>
@@ -9769,7 +9973,8 @@
                 <a:solidFill>
                   <a:schemeClr val="bg1"/>
                 </a:solidFill>
-                <a:latin typeface="Ubuntu" panose="020B0504030602030204" pitchFamily="34" charset="0"/>
+                <a:latin typeface="Arial" panose="020B0604020202020204" pitchFamily="34" charset="0"/>
+                <a:cs typeface="Arial" panose="020B0604020202020204" pitchFamily="34" charset="0"/>
               </a:rPr>
               <a:t>No usar blancos o negros sólidos</a:t>
             </a:r>
@@ -9777,7 +9982,8 @@
               <a:solidFill>
                 <a:schemeClr val="bg1"/>
               </a:solidFill>
-              <a:latin typeface="Ubuntu" panose="020B0504030602030204" pitchFamily="34" charset="0"/>
+              <a:latin typeface="Arial" panose="020B0604020202020204" pitchFamily="34" charset="0"/>
+              <a:cs typeface="Arial" panose="020B0604020202020204" pitchFamily="34" charset="0"/>
             </a:endParaRPr>
           </a:p>
         </p:txBody>
@@ -9867,15 +10073,27 @@
                 <a:solidFill>
                   <a:schemeClr val="bg1"/>
                 </a:solidFill>
-                <a:latin typeface="Futurama" pitchFamily="2" charset="0"/>
-              </a:rPr>
-              <a:t>Psicología de los colores</a:t>
+                <a:latin typeface="Arial" panose="020B0604020202020204" pitchFamily="34" charset="0"/>
+                <a:cs typeface="Arial" panose="020B0604020202020204" pitchFamily="34" charset="0"/>
+              </a:rPr>
+              <a:t>Psicología </a:t>
+            </a:r>
+            <a:r>
+              <a:rPr lang="es-MX" sz="8800" dirty="0" smtClean="0">
+                <a:solidFill>
+                  <a:schemeClr val="bg1"/>
+                </a:solidFill>
+                <a:latin typeface="Arial" panose="020B0604020202020204" pitchFamily="34" charset="0"/>
+                <a:cs typeface="Arial" panose="020B0604020202020204" pitchFamily="34" charset="0"/>
+              </a:rPr>
+              <a:t>de los colores</a:t>
             </a:r>
             <a:endParaRPr lang="es-VE" sz="8800" dirty="0">
               <a:solidFill>
                 <a:schemeClr val="bg1"/>
               </a:solidFill>
-              <a:latin typeface="Futurama" pitchFamily="2" charset="0"/>
+              <a:latin typeface="Arial" panose="020B0604020202020204" pitchFamily="34" charset="0"/>
+              <a:cs typeface="Arial" panose="020B0604020202020204" pitchFamily="34" charset="0"/>
             </a:endParaRPr>
           </a:p>
         </p:txBody>
@@ -9964,7 +10182,8 @@
                 <a:solidFill>
                   <a:schemeClr val="bg1"/>
                 </a:solidFill>
-                <a:latin typeface="Ubuntu" panose="020B0504030602030204" pitchFamily="34" charset="0"/>
+                <a:latin typeface="Arial" panose="020B0604020202020204" pitchFamily="34" charset="0"/>
+                <a:cs typeface="Arial" panose="020B0604020202020204" pitchFamily="34" charset="0"/>
               </a:rPr>
               <a:t>Marrón</a:t>
             </a:r>
@@ -10005,7 +10224,8 @@
                 <a:solidFill>
                   <a:schemeClr val="bg1"/>
                 </a:solidFill>
-                <a:latin typeface="Ubuntu" panose="020B0504030602030204" pitchFamily="34" charset="0"/>
+                <a:latin typeface="Arial" panose="020B0604020202020204" pitchFamily="34" charset="0"/>
+                <a:cs typeface="Arial" panose="020B0604020202020204" pitchFamily="34" charset="0"/>
               </a:rPr>
               <a:t>Naturaleza</a:t>
             </a:r>
@@ -10023,7 +10243,8 @@
                 <a:solidFill>
                   <a:schemeClr val="bg1"/>
                 </a:solidFill>
-                <a:latin typeface="Ubuntu" panose="020B0504030602030204" pitchFamily="34" charset="0"/>
+                <a:latin typeface="Arial" panose="020B0604020202020204" pitchFamily="34" charset="0"/>
+                <a:cs typeface="Arial" panose="020B0604020202020204" pitchFamily="34" charset="0"/>
               </a:rPr>
               <a:t>Rustico</a:t>
             </a:r>
@@ -10041,7 +10262,8 @@
                 <a:solidFill>
                   <a:schemeClr val="bg1"/>
                 </a:solidFill>
-                <a:latin typeface="Ubuntu" panose="020B0504030602030204" pitchFamily="34" charset="0"/>
+                <a:latin typeface="Arial" panose="020B0604020202020204" pitchFamily="34" charset="0"/>
+                <a:cs typeface="Arial" panose="020B0604020202020204" pitchFamily="34" charset="0"/>
               </a:rPr>
               <a:t>Calidez</a:t>
             </a:r>
@@ -10059,7 +10281,8 @@
                 <a:solidFill>
                   <a:schemeClr val="bg1"/>
                 </a:solidFill>
-                <a:latin typeface="Ubuntu" panose="020B0504030602030204" pitchFamily="34" charset="0"/>
+                <a:latin typeface="Arial" panose="020B0604020202020204" pitchFamily="34" charset="0"/>
+                <a:cs typeface="Arial" panose="020B0604020202020204" pitchFamily="34" charset="0"/>
               </a:rPr>
               <a:t>Acogedor</a:t>
             </a:r>
@@ -10077,7 +10300,8 @@
                 <a:solidFill>
                   <a:schemeClr val="bg1"/>
                 </a:solidFill>
-                <a:latin typeface="Ubuntu" panose="020B0504030602030204" pitchFamily="34" charset="0"/>
+                <a:latin typeface="Arial" panose="020B0604020202020204" pitchFamily="34" charset="0"/>
+                <a:cs typeface="Arial" panose="020B0604020202020204" pitchFamily="34" charset="0"/>
               </a:rPr>
               <a:t>Neutro</a:t>
             </a:r>
@@ -10095,7 +10319,8 @@
                 <a:solidFill>
                   <a:schemeClr val="bg1"/>
                 </a:solidFill>
-                <a:latin typeface="Ubuntu" panose="020B0504030602030204" pitchFamily="34" charset="0"/>
+                <a:latin typeface="Arial" panose="020B0604020202020204" pitchFamily="34" charset="0"/>
+                <a:cs typeface="Arial" panose="020B0604020202020204" pitchFamily="34" charset="0"/>
               </a:rPr>
               <a:t>C</a:t>
             </a:r>
@@ -10104,7 +10329,8 @@
                 <a:solidFill>
                   <a:schemeClr val="bg1"/>
                 </a:solidFill>
-                <a:latin typeface="Ubuntu" panose="020B0504030602030204" pitchFamily="34" charset="0"/>
+                <a:latin typeface="Arial" panose="020B0604020202020204" pitchFamily="34" charset="0"/>
+                <a:cs typeface="Arial" panose="020B0604020202020204" pitchFamily="34" charset="0"/>
               </a:rPr>
               <a:t>afé y chocolate</a:t>
             </a:r>
@@ -10112,7 +10338,8 @@
               <a:solidFill>
                 <a:schemeClr val="bg1"/>
               </a:solidFill>
-              <a:latin typeface="Ubuntu" panose="020B0504030602030204" pitchFamily="34" charset="0"/>
+              <a:latin typeface="Arial" panose="020B0604020202020204" pitchFamily="34" charset="0"/>
+              <a:cs typeface="Arial" panose="020B0604020202020204" pitchFamily="34" charset="0"/>
             </a:endParaRPr>
           </a:p>
         </p:txBody>
@@ -10309,7 +10536,8 @@
                 <a:solidFill>
                   <a:schemeClr val="bg1"/>
                 </a:solidFill>
-                <a:latin typeface="Ubuntu" panose="020B0504030602030204" pitchFamily="34" charset="0"/>
+                <a:latin typeface="Arial" panose="020B0604020202020204" pitchFamily="34" charset="0"/>
+                <a:cs typeface="Arial" panose="020B0604020202020204" pitchFamily="34" charset="0"/>
               </a:rPr>
               <a:t>Marrón</a:t>
             </a:r>

</xml_diff>